<commit_message>
last stand from last warrior
</commit_message>
<xml_diff>
--- a/DigSite/New Arcaism/uarm 2025 2/kant republica ciudadanía.pptx
+++ b/DigSite/New Arcaism/uarm 2025 2/kant republica ciudadanía.pptx
@@ -52,21 +52,22 @@
     <p:sldId id="303" r:id="rId46"/>
     <p:sldId id="304" r:id="rId47"/>
     <p:sldId id="305" r:id="rId48"/>
-    <p:sldId id="282" r:id="rId49"/>
-    <p:sldId id="261" r:id="rId50"/>
-    <p:sldId id="306" r:id="rId51"/>
-    <p:sldId id="307" r:id="rId52"/>
-    <p:sldId id="308" r:id="rId53"/>
-    <p:sldId id="309" r:id="rId54"/>
-    <p:sldId id="310" r:id="rId55"/>
-    <p:sldId id="311" r:id="rId56"/>
-    <p:sldId id="312" r:id="rId57"/>
-    <p:sldId id="313" r:id="rId58"/>
-    <p:sldId id="314" r:id="rId59"/>
-    <p:sldId id="315" r:id="rId60"/>
-    <p:sldId id="316" r:id="rId61"/>
-    <p:sldId id="317" r:id="rId62"/>
-    <p:sldId id="283" r:id="rId63"/>
+    <p:sldId id="318" r:id="rId49"/>
+    <p:sldId id="282" r:id="rId50"/>
+    <p:sldId id="261" r:id="rId51"/>
+    <p:sldId id="306" r:id="rId52"/>
+    <p:sldId id="307" r:id="rId53"/>
+    <p:sldId id="308" r:id="rId54"/>
+    <p:sldId id="309" r:id="rId55"/>
+    <p:sldId id="310" r:id="rId56"/>
+    <p:sldId id="311" r:id="rId57"/>
+    <p:sldId id="312" r:id="rId58"/>
+    <p:sldId id="313" r:id="rId59"/>
+    <p:sldId id="314" r:id="rId60"/>
+    <p:sldId id="315" r:id="rId61"/>
+    <p:sldId id="316" r:id="rId62"/>
+    <p:sldId id="317" r:id="rId63"/>
+    <p:sldId id="283" r:id="rId64"/>
   </p:sldIdLst>
   <p:sldSz cx="12192000" cy="6858000"/>
   <p:notesSz cx="6858000" cy="9144000"/>
@@ -322,7 +323,7 @@
           <a:p>
             <a:fld id="{8FE0C00A-DAAB-4CA9-9429-D5F41296EE4C}" type="datetimeFigureOut">
               <a:rPr lang="es-PE" smtClean="0"/>
-              <a:t>11/09/2025</a:t>
+              <a:t>21/10/2025</a:t>
             </a:fld>
             <a:endParaRPr lang="es-PE"/>
           </a:p>
@@ -522,7 +523,7 @@
           <a:p>
             <a:fld id="{8FE0C00A-DAAB-4CA9-9429-D5F41296EE4C}" type="datetimeFigureOut">
               <a:rPr lang="es-PE" smtClean="0"/>
-              <a:t>11/09/2025</a:t>
+              <a:t>21/10/2025</a:t>
             </a:fld>
             <a:endParaRPr lang="es-PE"/>
           </a:p>
@@ -732,7 +733,7 @@
           <a:p>
             <a:fld id="{8FE0C00A-DAAB-4CA9-9429-D5F41296EE4C}" type="datetimeFigureOut">
               <a:rPr lang="es-PE" smtClean="0"/>
-              <a:t>11/09/2025</a:t>
+              <a:t>21/10/2025</a:t>
             </a:fld>
             <a:endParaRPr lang="es-PE"/>
           </a:p>
@@ -932,7 +933,7 @@
           <a:p>
             <a:fld id="{8FE0C00A-DAAB-4CA9-9429-D5F41296EE4C}" type="datetimeFigureOut">
               <a:rPr lang="es-PE" smtClean="0"/>
-              <a:t>11/09/2025</a:t>
+              <a:t>21/10/2025</a:t>
             </a:fld>
             <a:endParaRPr lang="es-PE"/>
           </a:p>
@@ -1208,7 +1209,7 @@
           <a:p>
             <a:fld id="{8FE0C00A-DAAB-4CA9-9429-D5F41296EE4C}" type="datetimeFigureOut">
               <a:rPr lang="es-PE" smtClean="0"/>
-              <a:t>11/09/2025</a:t>
+              <a:t>21/10/2025</a:t>
             </a:fld>
             <a:endParaRPr lang="es-PE"/>
           </a:p>
@@ -1476,7 +1477,7 @@
           <a:p>
             <a:fld id="{8FE0C00A-DAAB-4CA9-9429-D5F41296EE4C}" type="datetimeFigureOut">
               <a:rPr lang="es-PE" smtClean="0"/>
-              <a:t>11/09/2025</a:t>
+              <a:t>21/10/2025</a:t>
             </a:fld>
             <a:endParaRPr lang="es-PE"/>
           </a:p>
@@ -1891,7 +1892,7 @@
           <a:p>
             <a:fld id="{8FE0C00A-DAAB-4CA9-9429-D5F41296EE4C}" type="datetimeFigureOut">
               <a:rPr lang="es-PE" smtClean="0"/>
-              <a:t>11/09/2025</a:t>
+              <a:t>21/10/2025</a:t>
             </a:fld>
             <a:endParaRPr lang="es-PE"/>
           </a:p>
@@ -2033,7 +2034,7 @@
           <a:p>
             <a:fld id="{8FE0C00A-DAAB-4CA9-9429-D5F41296EE4C}" type="datetimeFigureOut">
               <a:rPr lang="es-PE" smtClean="0"/>
-              <a:t>11/09/2025</a:t>
+              <a:t>21/10/2025</a:t>
             </a:fld>
             <a:endParaRPr lang="es-PE"/>
           </a:p>
@@ -2146,7 +2147,7 @@
           <a:p>
             <a:fld id="{8FE0C00A-DAAB-4CA9-9429-D5F41296EE4C}" type="datetimeFigureOut">
               <a:rPr lang="es-PE" smtClean="0"/>
-              <a:t>11/09/2025</a:t>
+              <a:t>21/10/2025</a:t>
             </a:fld>
             <a:endParaRPr lang="es-PE"/>
           </a:p>
@@ -2459,7 +2460,7 @@
           <a:p>
             <a:fld id="{8FE0C00A-DAAB-4CA9-9429-D5F41296EE4C}" type="datetimeFigureOut">
               <a:rPr lang="es-PE" smtClean="0"/>
-              <a:t>11/09/2025</a:t>
+              <a:t>21/10/2025</a:t>
             </a:fld>
             <a:endParaRPr lang="es-PE"/>
           </a:p>
@@ -2748,7 +2749,7 @@
           <a:p>
             <a:fld id="{8FE0C00A-DAAB-4CA9-9429-D5F41296EE4C}" type="datetimeFigureOut">
               <a:rPr lang="es-PE" smtClean="0"/>
-              <a:t>11/09/2025</a:t>
+              <a:t>21/10/2025</a:t>
             </a:fld>
             <a:endParaRPr lang="es-PE"/>
           </a:p>
@@ -2991,7 +2992,7 @@
           <a:p>
             <a:fld id="{8FE0C00A-DAAB-4CA9-9429-D5F41296EE4C}" type="datetimeFigureOut">
               <a:rPr lang="es-PE" smtClean="0"/>
-              <a:t>11/09/2025</a:t>
+              <a:t>21/10/2025</a:t>
             </a:fld>
             <a:endParaRPr lang="es-PE"/>
           </a:p>
@@ -24166,6 +24167,383 @@
         <p:cNvPr id="1" name="">
           <a:extLst>
             <a:ext uri="{FF2B5EF4-FFF2-40B4-BE49-F238E27FC236}">
+              <a16:creationId xmlns:a16="http://schemas.microsoft.com/office/drawing/2014/main" id="{55F8D944-9888-A590-94B2-491DC452DB1B}"/>
+            </a:ext>
+          </a:extLst>
+        </p:cNvPr>
+        <p:cNvGrpSpPr/>
+        <p:nvPr/>
+      </p:nvGrpSpPr>
+      <p:grpSpPr>
+        <a:xfrm>
+          <a:off x="0" y="0"/>
+          <a:ext cx="0" cy="0"/>
+          <a:chOff x="0" y="0"/>
+          <a:chExt cx="0" cy="0"/>
+        </a:xfrm>
+      </p:grpSpPr>
+      <p:sp>
+        <p:nvSpPr>
+          <p:cNvPr id="3" name="Content Placeholder 2">
+            <a:extLst>
+              <a:ext uri="{FF2B5EF4-FFF2-40B4-BE49-F238E27FC236}">
+                <a16:creationId xmlns:a16="http://schemas.microsoft.com/office/drawing/2014/main" id="{931B290D-966E-E639-2631-5BAF39886A08}"/>
+              </a:ext>
+            </a:extLst>
+          </p:cNvPr>
+          <p:cNvSpPr>
+            <a:spLocks noGrp="1"/>
+          </p:cNvSpPr>
+          <p:nvPr>
+            <p:ph idx="1"/>
+          </p:nvPr>
+        </p:nvSpPr>
+        <p:spPr>
+          <a:xfrm>
+            <a:off x="838200" y="1"/>
+            <a:ext cx="10515600" cy="931024"/>
+          </a:xfrm>
+        </p:spPr>
+        <p:txBody>
+          <a:bodyPr>
+            <a:normAutofit fontScale="77500" lnSpcReduction="20000"/>
+          </a:bodyPr>
+          <a:lstStyle/>
+          <a:p>
+            <a:pPr algn="just"/>
+            <a:r>
+              <a:rPr lang="en-US" dirty="0"/>
+              <a:t>1795: </a:t>
+            </a:r>
+            <a:r>
+              <a:rPr lang="en-US" i="1" dirty="0">
+                <a:solidFill>
+                  <a:srgbClr val="FF0000"/>
+                </a:solidFill>
+              </a:rPr>
+              <a:t>Perpetual Peace: A Philosophical Sketch</a:t>
+            </a:r>
+            <a:r>
+              <a:rPr lang="en-US" baseline="30000" dirty="0">
+                <a:hlinkClick r:id="rId2"/>
+              </a:rPr>
+              <a:t>[272]</a:t>
+            </a:r>
+            <a:r>
+              <a:rPr lang="en-US" dirty="0"/>
+              <a:t> [</a:t>
+            </a:r>
+            <a:r>
+              <a:rPr lang="en-US" b="1" dirty="0"/>
+              <a:t>PP</a:t>
+            </a:r>
+            <a:r>
+              <a:rPr lang="en-US" dirty="0"/>
+              <a:t>] ("</a:t>
+            </a:r>
+            <a:r>
+              <a:rPr lang="en-US" i="1" dirty="0"/>
+              <a:t>Zum </a:t>
+            </a:r>
+            <a:r>
+              <a:rPr lang="en-US" i="1" dirty="0" err="1"/>
+              <a:t>ewigen</a:t>
+            </a:r>
+            <a:r>
+              <a:rPr lang="en-US" i="1" dirty="0"/>
+              <a:t> Frieden</a:t>
+            </a:r>
+            <a:r>
+              <a:rPr lang="en-US" dirty="0"/>
+              <a:t>")</a:t>
+            </a:r>
+          </a:p>
+          <a:p>
+            <a:pPr algn="just"/>
+            <a:r>
+              <a:rPr lang="de-DE" dirty="0"/>
+              <a:t>Edición revisada: (1999) </a:t>
+            </a:r>
+            <a:r>
+              <a:rPr lang="de-DE" dirty="0">
+                <a:solidFill>
+                  <a:srgbClr val="FF0000"/>
+                </a:solidFill>
+              </a:rPr>
+              <a:t>Para la paz perpetua. Un esbozo filosófico</a:t>
+            </a:r>
+            <a:r>
+              <a:rPr lang="de-DE" dirty="0"/>
+              <a:t>. En: En defensa de la ilustración. Alba Ed. </a:t>
+            </a:r>
+          </a:p>
+          <a:p>
+            <a:pPr algn="just"/>
+            <a:endParaRPr lang="en-US" dirty="0"/>
+          </a:p>
+          <a:p>
+            <a:pPr algn="just"/>
+            <a:endParaRPr lang="de-DE" dirty="0"/>
+          </a:p>
+        </p:txBody>
+      </p:sp>
+      <p:sp>
+        <p:nvSpPr>
+          <p:cNvPr id="2" name="Content Placeholder 2">
+            <a:extLst>
+              <a:ext uri="{FF2B5EF4-FFF2-40B4-BE49-F238E27FC236}">
+                <a16:creationId xmlns:a16="http://schemas.microsoft.com/office/drawing/2014/main" id="{2F559890-4B82-9392-15FA-AFEFA639B7B9}"/>
+              </a:ext>
+            </a:extLst>
+          </p:cNvPr>
+          <p:cNvSpPr txBox="1">
+            <a:spLocks/>
+          </p:cNvSpPr>
+          <p:nvPr/>
+        </p:nvSpPr>
+        <p:spPr>
+          <a:xfrm>
+            <a:off x="365759" y="931025"/>
+            <a:ext cx="11621193" cy="5769033"/>
+          </a:xfrm>
+          <a:prstGeom prst="rect">
+            <a:avLst/>
+          </a:prstGeom>
+        </p:spPr>
+        <p:txBody>
+          <a:bodyPr vert="horz" lIns="91440" tIns="45720" rIns="91440" bIns="45720" rtlCol="0">
+            <a:normAutofit/>
+          </a:bodyPr>
+          <a:lstStyle>
+            <a:lvl1pPr marL="228600" indent="-228600" algn="l" defTabSz="914400" rtl="0" eaLnBrk="1" latinLnBrk="0" hangingPunct="1">
+              <a:lnSpc>
+                <a:spcPct val="90000"/>
+              </a:lnSpc>
+              <a:spcBef>
+                <a:spcPts val="1000"/>
+              </a:spcBef>
+              <a:buFont typeface="Arial" panose="020B0604020202020204" pitchFamily="34" charset="0"/>
+              <a:buChar char="•"/>
+              <a:defRPr sz="2800" kern="1200">
+                <a:solidFill>
+                  <a:schemeClr val="tx1"/>
+                </a:solidFill>
+                <a:latin typeface="+mn-lt"/>
+                <a:ea typeface="+mn-ea"/>
+                <a:cs typeface="+mn-cs"/>
+              </a:defRPr>
+            </a:lvl1pPr>
+            <a:lvl2pPr marL="685800" indent="-228600" algn="l" defTabSz="914400" rtl="0" eaLnBrk="1" latinLnBrk="0" hangingPunct="1">
+              <a:lnSpc>
+                <a:spcPct val="90000"/>
+              </a:lnSpc>
+              <a:spcBef>
+                <a:spcPts val="500"/>
+              </a:spcBef>
+              <a:buFont typeface="Arial" panose="020B0604020202020204" pitchFamily="34" charset="0"/>
+              <a:buChar char="•"/>
+              <a:defRPr sz="2400" kern="1200">
+                <a:solidFill>
+                  <a:schemeClr val="tx1"/>
+                </a:solidFill>
+                <a:latin typeface="+mn-lt"/>
+                <a:ea typeface="+mn-ea"/>
+                <a:cs typeface="+mn-cs"/>
+              </a:defRPr>
+            </a:lvl2pPr>
+            <a:lvl3pPr marL="1143000" indent="-228600" algn="l" defTabSz="914400" rtl="0" eaLnBrk="1" latinLnBrk="0" hangingPunct="1">
+              <a:lnSpc>
+                <a:spcPct val="90000"/>
+              </a:lnSpc>
+              <a:spcBef>
+                <a:spcPts val="500"/>
+              </a:spcBef>
+              <a:buFont typeface="Arial" panose="020B0604020202020204" pitchFamily="34" charset="0"/>
+              <a:buChar char="•"/>
+              <a:defRPr sz="2000" kern="1200">
+                <a:solidFill>
+                  <a:schemeClr val="tx1"/>
+                </a:solidFill>
+                <a:latin typeface="+mn-lt"/>
+                <a:ea typeface="+mn-ea"/>
+                <a:cs typeface="+mn-cs"/>
+              </a:defRPr>
+            </a:lvl3pPr>
+            <a:lvl4pPr marL="1600200" indent="-228600" algn="l" defTabSz="914400" rtl="0" eaLnBrk="1" latinLnBrk="0" hangingPunct="1">
+              <a:lnSpc>
+                <a:spcPct val="90000"/>
+              </a:lnSpc>
+              <a:spcBef>
+                <a:spcPts val="500"/>
+              </a:spcBef>
+              <a:buFont typeface="Arial" panose="020B0604020202020204" pitchFamily="34" charset="0"/>
+              <a:buChar char="•"/>
+              <a:defRPr sz="1800" kern="1200">
+                <a:solidFill>
+                  <a:schemeClr val="tx1"/>
+                </a:solidFill>
+                <a:latin typeface="+mn-lt"/>
+                <a:ea typeface="+mn-ea"/>
+                <a:cs typeface="+mn-cs"/>
+              </a:defRPr>
+            </a:lvl4pPr>
+            <a:lvl5pPr marL="2057400" indent="-228600" algn="l" defTabSz="914400" rtl="0" eaLnBrk="1" latinLnBrk="0" hangingPunct="1">
+              <a:lnSpc>
+                <a:spcPct val="90000"/>
+              </a:lnSpc>
+              <a:spcBef>
+                <a:spcPts val="500"/>
+              </a:spcBef>
+              <a:buFont typeface="Arial" panose="020B0604020202020204" pitchFamily="34" charset="0"/>
+              <a:buChar char="•"/>
+              <a:defRPr sz="1800" kern="1200">
+                <a:solidFill>
+                  <a:schemeClr val="tx1"/>
+                </a:solidFill>
+                <a:latin typeface="+mn-lt"/>
+                <a:ea typeface="+mn-ea"/>
+                <a:cs typeface="+mn-cs"/>
+              </a:defRPr>
+            </a:lvl5pPr>
+            <a:lvl6pPr marL="2514600" indent="-228600" algn="l" defTabSz="914400" rtl="0" eaLnBrk="1" latinLnBrk="0" hangingPunct="1">
+              <a:lnSpc>
+                <a:spcPct val="90000"/>
+              </a:lnSpc>
+              <a:spcBef>
+                <a:spcPts val="500"/>
+              </a:spcBef>
+              <a:buFont typeface="Arial" panose="020B0604020202020204" pitchFamily="34" charset="0"/>
+              <a:buChar char="•"/>
+              <a:defRPr sz="1800" kern="1200">
+                <a:solidFill>
+                  <a:schemeClr val="tx1"/>
+                </a:solidFill>
+                <a:latin typeface="+mn-lt"/>
+                <a:ea typeface="+mn-ea"/>
+                <a:cs typeface="+mn-cs"/>
+              </a:defRPr>
+            </a:lvl6pPr>
+            <a:lvl7pPr marL="2971800" indent="-228600" algn="l" defTabSz="914400" rtl="0" eaLnBrk="1" latinLnBrk="0" hangingPunct="1">
+              <a:lnSpc>
+                <a:spcPct val="90000"/>
+              </a:lnSpc>
+              <a:spcBef>
+                <a:spcPts val="500"/>
+              </a:spcBef>
+              <a:buFont typeface="Arial" panose="020B0604020202020204" pitchFamily="34" charset="0"/>
+              <a:buChar char="•"/>
+              <a:defRPr sz="1800" kern="1200">
+                <a:solidFill>
+                  <a:schemeClr val="tx1"/>
+                </a:solidFill>
+                <a:latin typeface="+mn-lt"/>
+                <a:ea typeface="+mn-ea"/>
+                <a:cs typeface="+mn-cs"/>
+              </a:defRPr>
+            </a:lvl7pPr>
+            <a:lvl8pPr marL="3429000" indent="-228600" algn="l" defTabSz="914400" rtl="0" eaLnBrk="1" latinLnBrk="0" hangingPunct="1">
+              <a:lnSpc>
+                <a:spcPct val="90000"/>
+              </a:lnSpc>
+              <a:spcBef>
+                <a:spcPts val="500"/>
+              </a:spcBef>
+              <a:buFont typeface="Arial" panose="020B0604020202020204" pitchFamily="34" charset="0"/>
+              <a:buChar char="•"/>
+              <a:defRPr sz="1800" kern="1200">
+                <a:solidFill>
+                  <a:schemeClr val="tx1"/>
+                </a:solidFill>
+                <a:latin typeface="+mn-lt"/>
+                <a:ea typeface="+mn-ea"/>
+                <a:cs typeface="+mn-cs"/>
+              </a:defRPr>
+            </a:lvl8pPr>
+            <a:lvl9pPr marL="3886200" indent="-228600" algn="l" defTabSz="914400" rtl="0" eaLnBrk="1" latinLnBrk="0" hangingPunct="1">
+              <a:lnSpc>
+                <a:spcPct val="90000"/>
+              </a:lnSpc>
+              <a:spcBef>
+                <a:spcPts val="500"/>
+              </a:spcBef>
+              <a:buFont typeface="Arial" panose="020B0604020202020204" pitchFamily="34" charset="0"/>
+              <a:buChar char="•"/>
+              <a:defRPr sz="1800" kern="1200">
+                <a:solidFill>
+                  <a:schemeClr val="tx1"/>
+                </a:solidFill>
+                <a:latin typeface="+mn-lt"/>
+                <a:ea typeface="+mn-ea"/>
+                <a:cs typeface="+mn-cs"/>
+              </a:defRPr>
+            </a:lvl9pPr>
+          </a:lstStyle>
+          <a:p>
+            <a:pPr marL="0" indent="0" algn="just">
+              <a:buNone/>
+            </a:pPr>
+            <a:r>
+              <a:rPr lang="de-DE" dirty="0"/>
+              <a:t>Nota al pie 108; PP, 1999, p.315 !!!</a:t>
+            </a:r>
+          </a:p>
+          <a:p>
+            <a:pPr marL="0" indent="0" algn="just">
+              <a:buNone/>
+            </a:pPr>
+            <a:r>
+              <a:rPr lang="de-DE" dirty="0"/>
+              <a:t>“La libertad jurídica (externa, por tanto) no puede definirse, como suele hacerse, por la competencia: &lt;&lt; Puede hacerse cuanto se quiera, si no se perjudica a nadie&gt;&gt;. Pues, ¿qué significa autorización? La posibilidad de una acción, en tanto que con ella no se perjudica a nadie. La explicación, por tanto, vendría a ser: &lt;&lt; “La libertad es la posibilidad de acciones con las que no se perjudica a nadie.“ No se perjudica a nadie (hágase lo que quiera) sólo si no se perjudica a nadie&gt;&gt;; es una huera tautología. </a:t>
+            </a:r>
+          </a:p>
+          <a:p>
+            <a:pPr marL="0" indent="0" algn="just">
+              <a:buNone/>
+            </a:pPr>
+            <a:endParaRPr lang="de-DE" dirty="0"/>
+          </a:p>
+          <a:p>
+            <a:pPr marL="0" indent="0" algn="just">
+              <a:buNone/>
+            </a:pPr>
+            <a:r>
+              <a:rPr lang="de-DE" dirty="0">
+                <a:solidFill>
+                  <a:srgbClr val="FF0000"/>
+                </a:solidFill>
+              </a:rPr>
+              <a:t>Mi libertad exterior (jurídica) ha de explicarse mejor así: es la competencia a no obedecer ninguna ley exterior si no he podido darle mi aprobación.</a:t>
+            </a:r>
+          </a:p>
+          <a:p>
+            <a:pPr marL="0" indent="0" algn="just">
+              <a:buNone/>
+            </a:pPr>
+            <a:endParaRPr lang="de-DE" dirty="0"/>
+          </a:p>
+        </p:txBody>
+      </p:sp>
+    </p:spTree>
+    <p:extLst>
+      <p:ext uri="{BB962C8B-B14F-4D97-AF65-F5344CB8AC3E}">
+        <p14:creationId xmlns:p14="http://schemas.microsoft.com/office/powerpoint/2010/main" val="3764473575"/>
+      </p:ext>
+    </p:extLst>
+  </p:cSld>
+  <p:clrMapOvr>
+    <a:masterClrMapping/>
+  </p:clrMapOvr>
+</p:sld>
+</file>
+
+<file path=ppt/slides/slide49.xml><?xml version="1.0" encoding="utf-8"?>
+<p:sld xmlns:a="http://schemas.openxmlformats.org/drawingml/2006/main" xmlns:r="http://schemas.openxmlformats.org/officeDocument/2006/relationships" xmlns:p="http://schemas.openxmlformats.org/presentationml/2006/main">
+  <p:cSld>
+    <p:spTree>
+      <p:nvGrpSpPr>
+        <p:cNvPr id="1" name="">
+          <a:extLst>
+            <a:ext uri="{FF2B5EF4-FFF2-40B4-BE49-F238E27FC236}">
               <a16:creationId xmlns:a16="http://schemas.microsoft.com/office/drawing/2014/main" id="{C6039261-F2D7-FC60-1F73-5DEC070AD1D6}"/>
             </a:ext>
           </a:extLst>
@@ -24265,384 +24643,6 @@
     <p:extLst>
       <p:ext uri="{BB962C8B-B14F-4D97-AF65-F5344CB8AC3E}">
         <p14:creationId xmlns:p14="http://schemas.microsoft.com/office/powerpoint/2010/main" val="418996914"/>
-      </p:ext>
-    </p:extLst>
-  </p:cSld>
-  <p:clrMapOvr>
-    <a:masterClrMapping/>
-  </p:clrMapOvr>
-</p:sld>
-</file>
-
-<file path=ppt/slides/slide49.xml><?xml version="1.0" encoding="utf-8"?>
-<p:sld xmlns:a="http://schemas.openxmlformats.org/drawingml/2006/main" xmlns:r="http://schemas.openxmlformats.org/officeDocument/2006/relationships" xmlns:p="http://schemas.openxmlformats.org/presentationml/2006/main">
-  <p:cSld>
-    <p:spTree>
-      <p:nvGrpSpPr>
-        <p:cNvPr id="1" name="">
-          <a:extLst>
-            <a:ext uri="{FF2B5EF4-FFF2-40B4-BE49-F238E27FC236}">
-              <a16:creationId xmlns:a16="http://schemas.microsoft.com/office/drawing/2014/main" id="{05209E0F-79A8-205F-7A66-ABE86C332DA8}"/>
-            </a:ext>
-          </a:extLst>
-        </p:cNvPr>
-        <p:cNvGrpSpPr/>
-        <p:nvPr/>
-      </p:nvGrpSpPr>
-      <p:grpSpPr>
-        <a:xfrm>
-          <a:off x="0" y="0"/>
-          <a:ext cx="0" cy="0"/>
-          <a:chOff x="0" y="0"/>
-          <a:chExt cx="0" cy="0"/>
-        </a:xfrm>
-      </p:grpSpPr>
-      <p:sp>
-        <p:nvSpPr>
-          <p:cNvPr id="3" name="Content Placeholder 2">
-            <a:extLst>
-              <a:ext uri="{FF2B5EF4-FFF2-40B4-BE49-F238E27FC236}">
-                <a16:creationId xmlns:a16="http://schemas.microsoft.com/office/drawing/2014/main" id="{3BA3CB5D-B4AE-0AB4-39FE-D989BC9CEBFF}"/>
-              </a:ext>
-            </a:extLst>
-          </p:cNvPr>
-          <p:cNvSpPr>
-            <a:spLocks noGrp="1"/>
-          </p:cNvSpPr>
-          <p:nvPr>
-            <p:ph idx="1"/>
-          </p:nvPr>
-        </p:nvSpPr>
-        <p:spPr>
-          <a:xfrm>
-            <a:off x="838200" y="1"/>
-            <a:ext cx="10515600" cy="1104899"/>
-          </a:xfrm>
-        </p:spPr>
-        <p:txBody>
-          <a:bodyPr>
-            <a:normAutofit fontScale="92500" lnSpcReduction="10000"/>
-          </a:bodyPr>
-          <a:lstStyle/>
-          <a:p>
-            <a:pPr algn="just"/>
-            <a:r>
-              <a:rPr lang="en-US" dirty="0"/>
-              <a:t>1797: </a:t>
-            </a:r>
-            <a:r>
-              <a:rPr lang="en-US" i="1" dirty="0">
-                <a:solidFill>
-                  <a:srgbClr val="FF0000"/>
-                </a:solidFill>
-              </a:rPr>
-              <a:t>Metaphysics of Morals</a:t>
-            </a:r>
-            <a:r>
-              <a:rPr lang="en-US" dirty="0">
-                <a:solidFill>
-                  <a:srgbClr val="FF0000"/>
-                </a:solidFill>
-              </a:rPr>
-              <a:t> </a:t>
-            </a:r>
-            <a:r>
-              <a:rPr lang="en-US" dirty="0"/>
-              <a:t>[</a:t>
-            </a:r>
-            <a:r>
-              <a:rPr lang="en-US" b="1" dirty="0"/>
-              <a:t>MM</a:t>
-            </a:r>
-            <a:r>
-              <a:rPr lang="en-US" dirty="0"/>
-              <a:t>] (</a:t>
-            </a:r>
-            <a:r>
-              <a:rPr lang="en-US" i="1" dirty="0" err="1"/>
-              <a:t>Metaphysik</a:t>
-            </a:r>
-            <a:r>
-              <a:rPr lang="en-US" i="1" dirty="0"/>
-              <a:t> der </a:t>
-            </a:r>
-            <a:r>
-              <a:rPr lang="en-US" i="1" dirty="0" err="1"/>
-              <a:t>Sitten</a:t>
-            </a:r>
-            <a:r>
-              <a:rPr lang="en-US" dirty="0"/>
-              <a:t>). First part is The Doctrine of Right, which has often been published separately as The Science of Right.</a:t>
-            </a:r>
-          </a:p>
-          <a:p>
-            <a:pPr algn="just"/>
-            <a:endParaRPr lang="de-DE" dirty="0"/>
-          </a:p>
-          <a:p>
-            <a:pPr algn="just"/>
-            <a:endParaRPr lang="de-DE" dirty="0"/>
-          </a:p>
-        </p:txBody>
-      </p:sp>
-      <p:sp>
-        <p:nvSpPr>
-          <p:cNvPr id="2" name="Content Placeholder 2">
-            <a:extLst>
-              <a:ext uri="{FF2B5EF4-FFF2-40B4-BE49-F238E27FC236}">
-                <a16:creationId xmlns:a16="http://schemas.microsoft.com/office/drawing/2014/main" id="{E0B7DFE8-D0B8-5A6C-9E43-28A5462AC830}"/>
-              </a:ext>
-            </a:extLst>
-          </p:cNvPr>
-          <p:cNvSpPr txBox="1">
-            <a:spLocks/>
-          </p:cNvSpPr>
-          <p:nvPr/>
-        </p:nvSpPr>
-        <p:spPr>
-          <a:xfrm>
-            <a:off x="365759" y="1246909"/>
-            <a:ext cx="11621193" cy="5453149"/>
-          </a:xfrm>
-          <a:prstGeom prst="rect">
-            <a:avLst/>
-          </a:prstGeom>
-        </p:spPr>
-        <p:txBody>
-          <a:bodyPr vert="horz" lIns="91440" tIns="45720" rIns="91440" bIns="45720" rtlCol="0">
-            <a:normAutofit/>
-          </a:bodyPr>
-          <a:lstStyle>
-            <a:lvl1pPr marL="228600" indent="-228600" algn="l" defTabSz="914400" rtl="0" eaLnBrk="1" latinLnBrk="0" hangingPunct="1">
-              <a:lnSpc>
-                <a:spcPct val="90000"/>
-              </a:lnSpc>
-              <a:spcBef>
-                <a:spcPts val="1000"/>
-              </a:spcBef>
-              <a:buFont typeface="Arial" panose="020B0604020202020204" pitchFamily="34" charset="0"/>
-              <a:buChar char="•"/>
-              <a:defRPr sz="2800" kern="1200">
-                <a:solidFill>
-                  <a:schemeClr val="tx1"/>
-                </a:solidFill>
-                <a:latin typeface="+mn-lt"/>
-                <a:ea typeface="+mn-ea"/>
-                <a:cs typeface="+mn-cs"/>
-              </a:defRPr>
-            </a:lvl1pPr>
-            <a:lvl2pPr marL="685800" indent="-228600" algn="l" defTabSz="914400" rtl="0" eaLnBrk="1" latinLnBrk="0" hangingPunct="1">
-              <a:lnSpc>
-                <a:spcPct val="90000"/>
-              </a:lnSpc>
-              <a:spcBef>
-                <a:spcPts val="500"/>
-              </a:spcBef>
-              <a:buFont typeface="Arial" panose="020B0604020202020204" pitchFamily="34" charset="0"/>
-              <a:buChar char="•"/>
-              <a:defRPr sz="2400" kern="1200">
-                <a:solidFill>
-                  <a:schemeClr val="tx1"/>
-                </a:solidFill>
-                <a:latin typeface="+mn-lt"/>
-                <a:ea typeface="+mn-ea"/>
-                <a:cs typeface="+mn-cs"/>
-              </a:defRPr>
-            </a:lvl2pPr>
-            <a:lvl3pPr marL="1143000" indent="-228600" algn="l" defTabSz="914400" rtl="0" eaLnBrk="1" latinLnBrk="0" hangingPunct="1">
-              <a:lnSpc>
-                <a:spcPct val="90000"/>
-              </a:lnSpc>
-              <a:spcBef>
-                <a:spcPts val="500"/>
-              </a:spcBef>
-              <a:buFont typeface="Arial" panose="020B0604020202020204" pitchFamily="34" charset="0"/>
-              <a:buChar char="•"/>
-              <a:defRPr sz="2000" kern="1200">
-                <a:solidFill>
-                  <a:schemeClr val="tx1"/>
-                </a:solidFill>
-                <a:latin typeface="+mn-lt"/>
-                <a:ea typeface="+mn-ea"/>
-                <a:cs typeface="+mn-cs"/>
-              </a:defRPr>
-            </a:lvl3pPr>
-            <a:lvl4pPr marL="1600200" indent="-228600" algn="l" defTabSz="914400" rtl="0" eaLnBrk="1" latinLnBrk="0" hangingPunct="1">
-              <a:lnSpc>
-                <a:spcPct val="90000"/>
-              </a:lnSpc>
-              <a:spcBef>
-                <a:spcPts val="500"/>
-              </a:spcBef>
-              <a:buFont typeface="Arial" panose="020B0604020202020204" pitchFamily="34" charset="0"/>
-              <a:buChar char="•"/>
-              <a:defRPr sz="1800" kern="1200">
-                <a:solidFill>
-                  <a:schemeClr val="tx1"/>
-                </a:solidFill>
-                <a:latin typeface="+mn-lt"/>
-                <a:ea typeface="+mn-ea"/>
-                <a:cs typeface="+mn-cs"/>
-              </a:defRPr>
-            </a:lvl4pPr>
-            <a:lvl5pPr marL="2057400" indent="-228600" algn="l" defTabSz="914400" rtl="0" eaLnBrk="1" latinLnBrk="0" hangingPunct="1">
-              <a:lnSpc>
-                <a:spcPct val="90000"/>
-              </a:lnSpc>
-              <a:spcBef>
-                <a:spcPts val="500"/>
-              </a:spcBef>
-              <a:buFont typeface="Arial" panose="020B0604020202020204" pitchFamily="34" charset="0"/>
-              <a:buChar char="•"/>
-              <a:defRPr sz="1800" kern="1200">
-                <a:solidFill>
-                  <a:schemeClr val="tx1"/>
-                </a:solidFill>
-                <a:latin typeface="+mn-lt"/>
-                <a:ea typeface="+mn-ea"/>
-                <a:cs typeface="+mn-cs"/>
-              </a:defRPr>
-            </a:lvl5pPr>
-            <a:lvl6pPr marL="2514600" indent="-228600" algn="l" defTabSz="914400" rtl="0" eaLnBrk="1" latinLnBrk="0" hangingPunct="1">
-              <a:lnSpc>
-                <a:spcPct val="90000"/>
-              </a:lnSpc>
-              <a:spcBef>
-                <a:spcPts val="500"/>
-              </a:spcBef>
-              <a:buFont typeface="Arial" panose="020B0604020202020204" pitchFamily="34" charset="0"/>
-              <a:buChar char="•"/>
-              <a:defRPr sz="1800" kern="1200">
-                <a:solidFill>
-                  <a:schemeClr val="tx1"/>
-                </a:solidFill>
-                <a:latin typeface="+mn-lt"/>
-                <a:ea typeface="+mn-ea"/>
-                <a:cs typeface="+mn-cs"/>
-              </a:defRPr>
-            </a:lvl6pPr>
-            <a:lvl7pPr marL="2971800" indent="-228600" algn="l" defTabSz="914400" rtl="0" eaLnBrk="1" latinLnBrk="0" hangingPunct="1">
-              <a:lnSpc>
-                <a:spcPct val="90000"/>
-              </a:lnSpc>
-              <a:spcBef>
-                <a:spcPts val="500"/>
-              </a:spcBef>
-              <a:buFont typeface="Arial" panose="020B0604020202020204" pitchFamily="34" charset="0"/>
-              <a:buChar char="•"/>
-              <a:defRPr sz="1800" kern="1200">
-                <a:solidFill>
-                  <a:schemeClr val="tx1"/>
-                </a:solidFill>
-                <a:latin typeface="+mn-lt"/>
-                <a:ea typeface="+mn-ea"/>
-                <a:cs typeface="+mn-cs"/>
-              </a:defRPr>
-            </a:lvl7pPr>
-            <a:lvl8pPr marL="3429000" indent="-228600" algn="l" defTabSz="914400" rtl="0" eaLnBrk="1" latinLnBrk="0" hangingPunct="1">
-              <a:lnSpc>
-                <a:spcPct val="90000"/>
-              </a:lnSpc>
-              <a:spcBef>
-                <a:spcPts val="500"/>
-              </a:spcBef>
-              <a:buFont typeface="Arial" panose="020B0604020202020204" pitchFamily="34" charset="0"/>
-              <a:buChar char="•"/>
-              <a:defRPr sz="1800" kern="1200">
-                <a:solidFill>
-                  <a:schemeClr val="tx1"/>
-                </a:solidFill>
-                <a:latin typeface="+mn-lt"/>
-                <a:ea typeface="+mn-ea"/>
-                <a:cs typeface="+mn-cs"/>
-              </a:defRPr>
-            </a:lvl8pPr>
-            <a:lvl9pPr marL="3886200" indent="-228600" algn="l" defTabSz="914400" rtl="0" eaLnBrk="1" latinLnBrk="0" hangingPunct="1">
-              <a:lnSpc>
-                <a:spcPct val="90000"/>
-              </a:lnSpc>
-              <a:spcBef>
-                <a:spcPts val="500"/>
-              </a:spcBef>
-              <a:buFont typeface="Arial" panose="020B0604020202020204" pitchFamily="34" charset="0"/>
-              <a:buChar char="•"/>
-              <a:defRPr sz="1800" kern="1200">
-                <a:solidFill>
-                  <a:schemeClr val="tx1"/>
-                </a:solidFill>
-                <a:latin typeface="+mn-lt"/>
-                <a:ea typeface="+mn-ea"/>
-                <a:cs typeface="+mn-cs"/>
-              </a:defRPr>
-            </a:lvl9pPr>
-          </a:lstStyle>
-          <a:p>
-            <a:pPr marL="0" indent="0" algn="just">
-              <a:buNone/>
-            </a:pPr>
-            <a:r>
-              <a:rPr lang="es-MX" dirty="0"/>
-              <a:t>Principio universal del derecho: “Es justa toda acción que, por sí, por su máxima, no es un obstáculo a la conformidad de la libertad del arbitrio de todos con la libertad de cada uno según leyes universales.” (2008, p. 42)</a:t>
-            </a:r>
-          </a:p>
-          <a:p>
-            <a:pPr marL="0" indent="0" algn="just">
-              <a:buNone/>
-            </a:pPr>
-            <a:endParaRPr lang="es-MX" dirty="0"/>
-          </a:p>
-          <a:p>
-            <a:pPr marL="0" indent="0" algn="just">
-              <a:buNone/>
-            </a:pPr>
-            <a:r>
-              <a:rPr lang="es-MX" dirty="0"/>
-              <a:t>Respecto de los deberes del derecho: “Puede admitirse la división de Ulpiano: (…) 1º Sé hombre honrado. La honradez en derecho consiste en mantener en las relaciones con los demás hombres la dignidad humana, deber que se formula así: no te entregues a los demás como instrumento puramente pasivo. (…) 2º No hagas daño a tercero. (…) 3º Entra (si no puedes evitarlo) con los hombres en una sociedad en que cada uno pueda conservar lo que le pertenece. Si esta última fórmula se tradujera diciendo: , sería absurda, porque a nadie se le puede dar lo que ya tiene.” (2008, p. 52) </a:t>
-            </a:r>
-            <a:endParaRPr lang="de-DE" dirty="0"/>
-          </a:p>
-          <a:p>
-            <a:pPr marL="0" indent="0" algn="just">
-              <a:buNone/>
-            </a:pPr>
-            <a:endParaRPr lang="de-DE" dirty="0"/>
-          </a:p>
-          <a:p>
-            <a:pPr marL="0" indent="0" algn="just">
-              <a:buNone/>
-            </a:pPr>
-            <a:endParaRPr lang="de-DE" dirty="0"/>
-          </a:p>
-          <a:p>
-            <a:pPr marL="0" indent="0" algn="just">
-              <a:buNone/>
-            </a:pPr>
-            <a:endParaRPr lang="de-DE" dirty="0"/>
-          </a:p>
-          <a:p>
-            <a:pPr marL="0" indent="0" algn="just">
-              <a:buNone/>
-            </a:pPr>
-            <a:endParaRPr lang="de-DE" dirty="0"/>
-          </a:p>
-          <a:p>
-            <a:pPr marL="0" indent="0" algn="just">
-              <a:buNone/>
-            </a:pPr>
-            <a:endParaRPr lang="de-DE" dirty="0"/>
-          </a:p>
-          <a:p>
-            <a:pPr marL="0" indent="0" algn="just">
-              <a:buNone/>
-            </a:pPr>
-            <a:endParaRPr lang="de-DE" dirty="0"/>
-          </a:p>
-        </p:txBody>
-      </p:sp>
-    </p:spTree>
-    <p:extLst>
-      <p:ext uri="{BB962C8B-B14F-4D97-AF65-F5344CB8AC3E}">
-        <p14:creationId xmlns:p14="http://schemas.microsoft.com/office/powerpoint/2010/main" val="3672551655"/>
       </p:ext>
     </p:extLst>
   </p:cSld>
@@ -25246,6 +25246,384 @@
         <p:cNvPr id="1" name="">
           <a:extLst>
             <a:ext uri="{FF2B5EF4-FFF2-40B4-BE49-F238E27FC236}">
+              <a16:creationId xmlns:a16="http://schemas.microsoft.com/office/drawing/2014/main" id="{05209E0F-79A8-205F-7A66-ABE86C332DA8}"/>
+            </a:ext>
+          </a:extLst>
+        </p:cNvPr>
+        <p:cNvGrpSpPr/>
+        <p:nvPr/>
+      </p:nvGrpSpPr>
+      <p:grpSpPr>
+        <a:xfrm>
+          <a:off x="0" y="0"/>
+          <a:ext cx="0" cy="0"/>
+          <a:chOff x="0" y="0"/>
+          <a:chExt cx="0" cy="0"/>
+        </a:xfrm>
+      </p:grpSpPr>
+      <p:sp>
+        <p:nvSpPr>
+          <p:cNvPr id="3" name="Content Placeholder 2">
+            <a:extLst>
+              <a:ext uri="{FF2B5EF4-FFF2-40B4-BE49-F238E27FC236}">
+                <a16:creationId xmlns:a16="http://schemas.microsoft.com/office/drawing/2014/main" id="{3BA3CB5D-B4AE-0AB4-39FE-D989BC9CEBFF}"/>
+              </a:ext>
+            </a:extLst>
+          </p:cNvPr>
+          <p:cNvSpPr>
+            <a:spLocks noGrp="1"/>
+          </p:cNvSpPr>
+          <p:nvPr>
+            <p:ph idx="1"/>
+          </p:nvPr>
+        </p:nvSpPr>
+        <p:spPr>
+          <a:xfrm>
+            <a:off x="838200" y="1"/>
+            <a:ext cx="10515600" cy="1104899"/>
+          </a:xfrm>
+        </p:spPr>
+        <p:txBody>
+          <a:bodyPr>
+            <a:normAutofit fontScale="92500" lnSpcReduction="10000"/>
+          </a:bodyPr>
+          <a:lstStyle/>
+          <a:p>
+            <a:pPr algn="just"/>
+            <a:r>
+              <a:rPr lang="en-US" dirty="0"/>
+              <a:t>1797: </a:t>
+            </a:r>
+            <a:r>
+              <a:rPr lang="en-US" i="1" dirty="0">
+                <a:solidFill>
+                  <a:srgbClr val="FF0000"/>
+                </a:solidFill>
+              </a:rPr>
+              <a:t>Metaphysics of Morals</a:t>
+            </a:r>
+            <a:r>
+              <a:rPr lang="en-US" dirty="0">
+                <a:solidFill>
+                  <a:srgbClr val="FF0000"/>
+                </a:solidFill>
+              </a:rPr>
+              <a:t> </a:t>
+            </a:r>
+            <a:r>
+              <a:rPr lang="en-US" dirty="0"/>
+              <a:t>[</a:t>
+            </a:r>
+            <a:r>
+              <a:rPr lang="en-US" b="1" dirty="0"/>
+              <a:t>MM</a:t>
+            </a:r>
+            <a:r>
+              <a:rPr lang="en-US" dirty="0"/>
+              <a:t>] (</a:t>
+            </a:r>
+            <a:r>
+              <a:rPr lang="en-US" i="1" dirty="0" err="1"/>
+              <a:t>Metaphysik</a:t>
+            </a:r>
+            <a:r>
+              <a:rPr lang="en-US" i="1" dirty="0"/>
+              <a:t> der </a:t>
+            </a:r>
+            <a:r>
+              <a:rPr lang="en-US" i="1" dirty="0" err="1"/>
+              <a:t>Sitten</a:t>
+            </a:r>
+            <a:r>
+              <a:rPr lang="en-US" dirty="0"/>
+              <a:t>). First part is The Doctrine of Right, which has often been published separately as The Science of Right.</a:t>
+            </a:r>
+          </a:p>
+          <a:p>
+            <a:pPr algn="just"/>
+            <a:endParaRPr lang="de-DE" dirty="0"/>
+          </a:p>
+          <a:p>
+            <a:pPr algn="just"/>
+            <a:endParaRPr lang="de-DE" dirty="0"/>
+          </a:p>
+        </p:txBody>
+      </p:sp>
+      <p:sp>
+        <p:nvSpPr>
+          <p:cNvPr id="2" name="Content Placeholder 2">
+            <a:extLst>
+              <a:ext uri="{FF2B5EF4-FFF2-40B4-BE49-F238E27FC236}">
+                <a16:creationId xmlns:a16="http://schemas.microsoft.com/office/drawing/2014/main" id="{E0B7DFE8-D0B8-5A6C-9E43-28A5462AC830}"/>
+              </a:ext>
+            </a:extLst>
+          </p:cNvPr>
+          <p:cNvSpPr txBox="1">
+            <a:spLocks/>
+          </p:cNvSpPr>
+          <p:nvPr/>
+        </p:nvSpPr>
+        <p:spPr>
+          <a:xfrm>
+            <a:off x="365759" y="1246909"/>
+            <a:ext cx="11621193" cy="5453149"/>
+          </a:xfrm>
+          <a:prstGeom prst="rect">
+            <a:avLst/>
+          </a:prstGeom>
+        </p:spPr>
+        <p:txBody>
+          <a:bodyPr vert="horz" lIns="91440" tIns="45720" rIns="91440" bIns="45720" rtlCol="0">
+            <a:normAutofit/>
+          </a:bodyPr>
+          <a:lstStyle>
+            <a:lvl1pPr marL="228600" indent="-228600" algn="l" defTabSz="914400" rtl="0" eaLnBrk="1" latinLnBrk="0" hangingPunct="1">
+              <a:lnSpc>
+                <a:spcPct val="90000"/>
+              </a:lnSpc>
+              <a:spcBef>
+                <a:spcPts val="1000"/>
+              </a:spcBef>
+              <a:buFont typeface="Arial" panose="020B0604020202020204" pitchFamily="34" charset="0"/>
+              <a:buChar char="•"/>
+              <a:defRPr sz="2800" kern="1200">
+                <a:solidFill>
+                  <a:schemeClr val="tx1"/>
+                </a:solidFill>
+                <a:latin typeface="+mn-lt"/>
+                <a:ea typeface="+mn-ea"/>
+                <a:cs typeface="+mn-cs"/>
+              </a:defRPr>
+            </a:lvl1pPr>
+            <a:lvl2pPr marL="685800" indent="-228600" algn="l" defTabSz="914400" rtl="0" eaLnBrk="1" latinLnBrk="0" hangingPunct="1">
+              <a:lnSpc>
+                <a:spcPct val="90000"/>
+              </a:lnSpc>
+              <a:spcBef>
+                <a:spcPts val="500"/>
+              </a:spcBef>
+              <a:buFont typeface="Arial" panose="020B0604020202020204" pitchFamily="34" charset="0"/>
+              <a:buChar char="•"/>
+              <a:defRPr sz="2400" kern="1200">
+                <a:solidFill>
+                  <a:schemeClr val="tx1"/>
+                </a:solidFill>
+                <a:latin typeface="+mn-lt"/>
+                <a:ea typeface="+mn-ea"/>
+                <a:cs typeface="+mn-cs"/>
+              </a:defRPr>
+            </a:lvl2pPr>
+            <a:lvl3pPr marL="1143000" indent="-228600" algn="l" defTabSz="914400" rtl="0" eaLnBrk="1" latinLnBrk="0" hangingPunct="1">
+              <a:lnSpc>
+                <a:spcPct val="90000"/>
+              </a:lnSpc>
+              <a:spcBef>
+                <a:spcPts val="500"/>
+              </a:spcBef>
+              <a:buFont typeface="Arial" panose="020B0604020202020204" pitchFamily="34" charset="0"/>
+              <a:buChar char="•"/>
+              <a:defRPr sz="2000" kern="1200">
+                <a:solidFill>
+                  <a:schemeClr val="tx1"/>
+                </a:solidFill>
+                <a:latin typeface="+mn-lt"/>
+                <a:ea typeface="+mn-ea"/>
+                <a:cs typeface="+mn-cs"/>
+              </a:defRPr>
+            </a:lvl3pPr>
+            <a:lvl4pPr marL="1600200" indent="-228600" algn="l" defTabSz="914400" rtl="0" eaLnBrk="1" latinLnBrk="0" hangingPunct="1">
+              <a:lnSpc>
+                <a:spcPct val="90000"/>
+              </a:lnSpc>
+              <a:spcBef>
+                <a:spcPts val="500"/>
+              </a:spcBef>
+              <a:buFont typeface="Arial" panose="020B0604020202020204" pitchFamily="34" charset="0"/>
+              <a:buChar char="•"/>
+              <a:defRPr sz="1800" kern="1200">
+                <a:solidFill>
+                  <a:schemeClr val="tx1"/>
+                </a:solidFill>
+                <a:latin typeface="+mn-lt"/>
+                <a:ea typeface="+mn-ea"/>
+                <a:cs typeface="+mn-cs"/>
+              </a:defRPr>
+            </a:lvl4pPr>
+            <a:lvl5pPr marL="2057400" indent="-228600" algn="l" defTabSz="914400" rtl="0" eaLnBrk="1" latinLnBrk="0" hangingPunct="1">
+              <a:lnSpc>
+                <a:spcPct val="90000"/>
+              </a:lnSpc>
+              <a:spcBef>
+                <a:spcPts val="500"/>
+              </a:spcBef>
+              <a:buFont typeface="Arial" panose="020B0604020202020204" pitchFamily="34" charset="0"/>
+              <a:buChar char="•"/>
+              <a:defRPr sz="1800" kern="1200">
+                <a:solidFill>
+                  <a:schemeClr val="tx1"/>
+                </a:solidFill>
+                <a:latin typeface="+mn-lt"/>
+                <a:ea typeface="+mn-ea"/>
+                <a:cs typeface="+mn-cs"/>
+              </a:defRPr>
+            </a:lvl5pPr>
+            <a:lvl6pPr marL="2514600" indent="-228600" algn="l" defTabSz="914400" rtl="0" eaLnBrk="1" latinLnBrk="0" hangingPunct="1">
+              <a:lnSpc>
+                <a:spcPct val="90000"/>
+              </a:lnSpc>
+              <a:spcBef>
+                <a:spcPts val="500"/>
+              </a:spcBef>
+              <a:buFont typeface="Arial" panose="020B0604020202020204" pitchFamily="34" charset="0"/>
+              <a:buChar char="•"/>
+              <a:defRPr sz="1800" kern="1200">
+                <a:solidFill>
+                  <a:schemeClr val="tx1"/>
+                </a:solidFill>
+                <a:latin typeface="+mn-lt"/>
+                <a:ea typeface="+mn-ea"/>
+                <a:cs typeface="+mn-cs"/>
+              </a:defRPr>
+            </a:lvl6pPr>
+            <a:lvl7pPr marL="2971800" indent="-228600" algn="l" defTabSz="914400" rtl="0" eaLnBrk="1" latinLnBrk="0" hangingPunct="1">
+              <a:lnSpc>
+                <a:spcPct val="90000"/>
+              </a:lnSpc>
+              <a:spcBef>
+                <a:spcPts val="500"/>
+              </a:spcBef>
+              <a:buFont typeface="Arial" panose="020B0604020202020204" pitchFamily="34" charset="0"/>
+              <a:buChar char="•"/>
+              <a:defRPr sz="1800" kern="1200">
+                <a:solidFill>
+                  <a:schemeClr val="tx1"/>
+                </a:solidFill>
+                <a:latin typeface="+mn-lt"/>
+                <a:ea typeface="+mn-ea"/>
+                <a:cs typeface="+mn-cs"/>
+              </a:defRPr>
+            </a:lvl7pPr>
+            <a:lvl8pPr marL="3429000" indent="-228600" algn="l" defTabSz="914400" rtl="0" eaLnBrk="1" latinLnBrk="0" hangingPunct="1">
+              <a:lnSpc>
+                <a:spcPct val="90000"/>
+              </a:lnSpc>
+              <a:spcBef>
+                <a:spcPts val="500"/>
+              </a:spcBef>
+              <a:buFont typeface="Arial" panose="020B0604020202020204" pitchFamily="34" charset="0"/>
+              <a:buChar char="•"/>
+              <a:defRPr sz="1800" kern="1200">
+                <a:solidFill>
+                  <a:schemeClr val="tx1"/>
+                </a:solidFill>
+                <a:latin typeface="+mn-lt"/>
+                <a:ea typeface="+mn-ea"/>
+                <a:cs typeface="+mn-cs"/>
+              </a:defRPr>
+            </a:lvl8pPr>
+            <a:lvl9pPr marL="3886200" indent="-228600" algn="l" defTabSz="914400" rtl="0" eaLnBrk="1" latinLnBrk="0" hangingPunct="1">
+              <a:lnSpc>
+                <a:spcPct val="90000"/>
+              </a:lnSpc>
+              <a:spcBef>
+                <a:spcPts val="500"/>
+              </a:spcBef>
+              <a:buFont typeface="Arial" panose="020B0604020202020204" pitchFamily="34" charset="0"/>
+              <a:buChar char="•"/>
+              <a:defRPr sz="1800" kern="1200">
+                <a:solidFill>
+                  <a:schemeClr val="tx1"/>
+                </a:solidFill>
+                <a:latin typeface="+mn-lt"/>
+                <a:ea typeface="+mn-ea"/>
+                <a:cs typeface="+mn-cs"/>
+              </a:defRPr>
+            </a:lvl9pPr>
+          </a:lstStyle>
+          <a:p>
+            <a:pPr marL="0" indent="0" algn="just">
+              <a:buNone/>
+            </a:pPr>
+            <a:r>
+              <a:rPr lang="es-MX" dirty="0"/>
+              <a:t>Principio universal del derecho: “Es justa toda acción que, por sí, por su máxima, no es un obstáculo a la conformidad de la libertad del arbitrio de todos con la libertad de cada uno según leyes universales.” (2008, p. 42)</a:t>
+            </a:r>
+          </a:p>
+          <a:p>
+            <a:pPr marL="0" indent="0" algn="just">
+              <a:buNone/>
+            </a:pPr>
+            <a:endParaRPr lang="es-MX" dirty="0"/>
+          </a:p>
+          <a:p>
+            <a:pPr marL="0" indent="0" algn="just">
+              <a:buNone/>
+            </a:pPr>
+            <a:r>
+              <a:rPr lang="es-MX" dirty="0"/>
+              <a:t>Respecto de los deberes del derecho: “Puede admitirse la división de Ulpiano: (…) 1º Sé hombre honrado. La honradez en derecho consiste en mantener en las relaciones con los demás hombres la dignidad humana, deber que se formula así: no te entregues a los demás como instrumento puramente pasivo. (…) 2º No hagas daño a tercero. (…) 3º Entra (si no puedes evitarlo) con los hombres en una sociedad en que cada uno pueda conservar lo que le pertenece. Si esta última fórmula se tradujera diciendo: , sería absurda, porque a nadie se le puede dar lo que ya tiene.” (2008, p. 52) </a:t>
+            </a:r>
+            <a:endParaRPr lang="de-DE" dirty="0"/>
+          </a:p>
+          <a:p>
+            <a:pPr marL="0" indent="0" algn="just">
+              <a:buNone/>
+            </a:pPr>
+            <a:endParaRPr lang="de-DE" dirty="0"/>
+          </a:p>
+          <a:p>
+            <a:pPr marL="0" indent="0" algn="just">
+              <a:buNone/>
+            </a:pPr>
+            <a:endParaRPr lang="de-DE" dirty="0"/>
+          </a:p>
+          <a:p>
+            <a:pPr marL="0" indent="0" algn="just">
+              <a:buNone/>
+            </a:pPr>
+            <a:endParaRPr lang="de-DE" dirty="0"/>
+          </a:p>
+          <a:p>
+            <a:pPr marL="0" indent="0" algn="just">
+              <a:buNone/>
+            </a:pPr>
+            <a:endParaRPr lang="de-DE" dirty="0"/>
+          </a:p>
+          <a:p>
+            <a:pPr marL="0" indent="0" algn="just">
+              <a:buNone/>
+            </a:pPr>
+            <a:endParaRPr lang="de-DE" dirty="0"/>
+          </a:p>
+          <a:p>
+            <a:pPr marL="0" indent="0" algn="just">
+              <a:buNone/>
+            </a:pPr>
+            <a:endParaRPr lang="de-DE" dirty="0"/>
+          </a:p>
+        </p:txBody>
+      </p:sp>
+    </p:spTree>
+    <p:extLst>
+      <p:ext uri="{BB962C8B-B14F-4D97-AF65-F5344CB8AC3E}">
+        <p14:creationId xmlns:p14="http://schemas.microsoft.com/office/powerpoint/2010/main" val="3672551655"/>
+      </p:ext>
+    </p:extLst>
+  </p:cSld>
+  <p:clrMapOvr>
+    <a:masterClrMapping/>
+  </p:clrMapOvr>
+</p:sld>
+</file>
+
+<file path=ppt/slides/slide51.xml><?xml version="1.0" encoding="utf-8"?>
+<p:sld xmlns:a="http://schemas.openxmlformats.org/drawingml/2006/main" xmlns:r="http://schemas.openxmlformats.org/officeDocument/2006/relationships" xmlns:p="http://schemas.openxmlformats.org/presentationml/2006/main">
+  <p:cSld>
+    <p:spTree>
+      <p:nvGrpSpPr>
+        <p:cNvPr id="1" name="">
+          <a:extLst>
+            <a:ext uri="{FF2B5EF4-FFF2-40B4-BE49-F238E27FC236}">
               <a16:creationId xmlns:a16="http://schemas.microsoft.com/office/drawing/2014/main" id="{2EBFED94-0067-6848-0486-DA3C2C93D915}"/>
             </a:ext>
           </a:extLst>
@@ -25634,7 +26012,7 @@
 </p:sld>
 </file>
 
-<file path=ppt/slides/slide51.xml><?xml version="1.0" encoding="utf-8"?>
+<file path=ppt/slides/slide52.xml><?xml version="1.0" encoding="utf-8"?>
 <p:sld xmlns:a="http://schemas.openxmlformats.org/drawingml/2006/main" xmlns:r="http://schemas.openxmlformats.org/officeDocument/2006/relationships" xmlns:p="http://schemas.openxmlformats.org/presentationml/2006/main">
   <p:cSld>
     <p:spTree>
@@ -25985,7 +26363,7 @@
 </p:sld>
 </file>
 
-<file path=ppt/slides/slide52.xml><?xml version="1.0" encoding="utf-8"?>
+<file path=ppt/slides/slide53.xml><?xml version="1.0" encoding="utf-8"?>
 <p:sld xmlns:a="http://schemas.openxmlformats.org/drawingml/2006/main" xmlns:r="http://schemas.openxmlformats.org/officeDocument/2006/relationships" xmlns:p="http://schemas.openxmlformats.org/presentationml/2006/main">
   <p:cSld>
     <p:spTree>
@@ -26376,7 +26754,7 @@
 </p:sld>
 </file>
 
-<file path=ppt/slides/slide53.xml><?xml version="1.0" encoding="utf-8"?>
+<file path=ppt/slides/slide54.xml><?xml version="1.0" encoding="utf-8"?>
 <p:sld xmlns:a="http://schemas.openxmlformats.org/drawingml/2006/main" xmlns:r="http://schemas.openxmlformats.org/officeDocument/2006/relationships" xmlns:p="http://schemas.openxmlformats.org/presentationml/2006/main">
   <p:cSld>
     <p:spTree>
@@ -26753,7 +27131,7 @@
 </p:sld>
 </file>
 
-<file path=ppt/slides/slide54.xml><?xml version="1.0" encoding="utf-8"?>
+<file path=ppt/slides/slide55.xml><?xml version="1.0" encoding="utf-8"?>
 <p:sld xmlns:a="http://schemas.openxmlformats.org/drawingml/2006/main" xmlns:r="http://schemas.openxmlformats.org/officeDocument/2006/relationships" xmlns:p="http://schemas.openxmlformats.org/presentationml/2006/main">
   <p:cSld>
     <p:spTree>
@@ -27080,7 +27458,7 @@
 </p:sld>
 </file>
 
-<file path=ppt/slides/slide55.xml><?xml version="1.0" encoding="utf-8"?>
+<file path=ppt/slides/slide56.xml><?xml version="1.0" encoding="utf-8"?>
 <p:sld xmlns:a="http://schemas.openxmlformats.org/drawingml/2006/main" xmlns:r="http://schemas.openxmlformats.org/officeDocument/2006/relationships" xmlns:p="http://schemas.openxmlformats.org/presentationml/2006/main">
   <p:cSld>
     <p:spTree>
@@ -27422,7 +27800,7 @@
 </p:sld>
 </file>
 
-<file path=ppt/slides/slide56.xml><?xml version="1.0" encoding="utf-8"?>
+<file path=ppt/slides/slide57.xml><?xml version="1.0" encoding="utf-8"?>
 <p:sld xmlns:a="http://schemas.openxmlformats.org/drawingml/2006/main" xmlns:r="http://schemas.openxmlformats.org/officeDocument/2006/relationships" xmlns:p="http://schemas.openxmlformats.org/presentationml/2006/main">
   <p:cSld>
     <p:spTree>
@@ -27749,7 +28127,7 @@
 </p:sld>
 </file>
 
-<file path=ppt/slides/slide57.xml><?xml version="1.0" encoding="utf-8"?>
+<file path=ppt/slides/slide58.xml><?xml version="1.0" encoding="utf-8"?>
 <p:sld xmlns:a="http://schemas.openxmlformats.org/drawingml/2006/main" xmlns:r="http://schemas.openxmlformats.org/officeDocument/2006/relationships" xmlns:p="http://schemas.openxmlformats.org/presentationml/2006/main">
   <p:cSld>
     <p:spTree>
@@ -28091,7 +28469,7 @@
 </p:sld>
 </file>
 
-<file path=ppt/slides/slide58.xml><?xml version="1.0" encoding="utf-8"?>
+<file path=ppt/slides/slide59.xml><?xml version="1.0" encoding="utf-8"?>
 <p:sld xmlns:a="http://schemas.openxmlformats.org/drawingml/2006/main" xmlns:r="http://schemas.openxmlformats.org/officeDocument/2006/relationships" xmlns:p="http://schemas.openxmlformats.org/presentationml/2006/main">
   <p:cSld>
     <p:spTree>
@@ -28409,333 +28787,6 @@
     <p:extLst>
       <p:ext uri="{BB962C8B-B14F-4D97-AF65-F5344CB8AC3E}">
         <p14:creationId xmlns:p14="http://schemas.microsoft.com/office/powerpoint/2010/main" val="1817269755"/>
-      </p:ext>
-    </p:extLst>
-  </p:cSld>
-  <p:clrMapOvr>
-    <a:masterClrMapping/>
-  </p:clrMapOvr>
-</p:sld>
-</file>
-
-<file path=ppt/slides/slide59.xml><?xml version="1.0" encoding="utf-8"?>
-<p:sld xmlns:a="http://schemas.openxmlformats.org/drawingml/2006/main" xmlns:r="http://schemas.openxmlformats.org/officeDocument/2006/relationships" xmlns:p="http://schemas.openxmlformats.org/presentationml/2006/main">
-  <p:cSld>
-    <p:spTree>
-      <p:nvGrpSpPr>
-        <p:cNvPr id="1" name="">
-          <a:extLst>
-            <a:ext uri="{FF2B5EF4-FFF2-40B4-BE49-F238E27FC236}">
-              <a16:creationId xmlns:a16="http://schemas.microsoft.com/office/drawing/2014/main" id="{5E51E5CD-0CE0-C710-2C70-7BFD766C4F8A}"/>
-            </a:ext>
-          </a:extLst>
-        </p:cNvPr>
-        <p:cNvGrpSpPr/>
-        <p:nvPr/>
-      </p:nvGrpSpPr>
-      <p:grpSpPr>
-        <a:xfrm>
-          <a:off x="0" y="0"/>
-          <a:ext cx="0" cy="0"/>
-          <a:chOff x="0" y="0"/>
-          <a:chExt cx="0" cy="0"/>
-        </a:xfrm>
-      </p:grpSpPr>
-      <p:sp>
-        <p:nvSpPr>
-          <p:cNvPr id="3" name="Content Placeholder 2">
-            <a:extLst>
-              <a:ext uri="{FF2B5EF4-FFF2-40B4-BE49-F238E27FC236}">
-                <a16:creationId xmlns:a16="http://schemas.microsoft.com/office/drawing/2014/main" id="{EBA6AB39-B205-4BF7-858C-3EC1EF5B141D}"/>
-              </a:ext>
-            </a:extLst>
-          </p:cNvPr>
-          <p:cNvSpPr>
-            <a:spLocks noGrp="1"/>
-          </p:cNvSpPr>
-          <p:nvPr>
-            <p:ph idx="1"/>
-          </p:nvPr>
-        </p:nvSpPr>
-        <p:spPr>
-          <a:xfrm>
-            <a:off x="838200" y="1"/>
-            <a:ext cx="10515600" cy="1104899"/>
-          </a:xfrm>
-        </p:spPr>
-        <p:txBody>
-          <a:bodyPr>
-            <a:normAutofit fontScale="92500" lnSpcReduction="10000"/>
-          </a:bodyPr>
-          <a:lstStyle/>
-          <a:p>
-            <a:pPr algn="just"/>
-            <a:r>
-              <a:rPr lang="en-US" dirty="0"/>
-              <a:t>1797: </a:t>
-            </a:r>
-            <a:r>
-              <a:rPr lang="en-US" i="1" dirty="0">
-                <a:solidFill>
-                  <a:srgbClr val="FF0000"/>
-                </a:solidFill>
-              </a:rPr>
-              <a:t>Metaphysics of Morals</a:t>
-            </a:r>
-            <a:r>
-              <a:rPr lang="en-US" dirty="0">
-                <a:solidFill>
-                  <a:srgbClr val="FF0000"/>
-                </a:solidFill>
-              </a:rPr>
-              <a:t> </a:t>
-            </a:r>
-            <a:r>
-              <a:rPr lang="en-US" dirty="0"/>
-              <a:t>[</a:t>
-            </a:r>
-            <a:r>
-              <a:rPr lang="en-US" b="1" dirty="0"/>
-              <a:t>MM</a:t>
-            </a:r>
-            <a:r>
-              <a:rPr lang="en-US" dirty="0"/>
-              <a:t>] (</a:t>
-            </a:r>
-            <a:r>
-              <a:rPr lang="en-US" i="1" dirty="0" err="1"/>
-              <a:t>Metaphysik</a:t>
-            </a:r>
-            <a:r>
-              <a:rPr lang="en-US" i="1" dirty="0"/>
-              <a:t> der </a:t>
-            </a:r>
-            <a:r>
-              <a:rPr lang="en-US" i="1" dirty="0" err="1"/>
-              <a:t>Sitten</a:t>
-            </a:r>
-            <a:r>
-              <a:rPr lang="en-US" dirty="0"/>
-              <a:t>). First part is The Doctrine of Right, which has often been published separately as The Science of Right.</a:t>
-            </a:r>
-          </a:p>
-          <a:p>
-            <a:pPr algn="just"/>
-            <a:endParaRPr lang="de-DE" dirty="0"/>
-          </a:p>
-          <a:p>
-            <a:pPr algn="just"/>
-            <a:endParaRPr lang="de-DE" dirty="0"/>
-          </a:p>
-        </p:txBody>
-      </p:sp>
-      <p:sp>
-        <p:nvSpPr>
-          <p:cNvPr id="2" name="Content Placeholder 2">
-            <a:extLst>
-              <a:ext uri="{FF2B5EF4-FFF2-40B4-BE49-F238E27FC236}">
-                <a16:creationId xmlns:a16="http://schemas.microsoft.com/office/drawing/2014/main" id="{B3BD1A68-14E7-EF8B-D015-B18861402798}"/>
-              </a:ext>
-            </a:extLst>
-          </p:cNvPr>
-          <p:cNvSpPr txBox="1">
-            <a:spLocks/>
-          </p:cNvSpPr>
-          <p:nvPr/>
-        </p:nvSpPr>
-        <p:spPr>
-          <a:xfrm>
-            <a:off x="365759" y="1246909"/>
-            <a:ext cx="11621193" cy="5453149"/>
-          </a:xfrm>
-          <a:prstGeom prst="rect">
-            <a:avLst/>
-          </a:prstGeom>
-        </p:spPr>
-        <p:txBody>
-          <a:bodyPr vert="horz" lIns="91440" tIns="45720" rIns="91440" bIns="45720" rtlCol="0">
-            <a:normAutofit/>
-          </a:bodyPr>
-          <a:lstStyle>
-            <a:lvl1pPr marL="228600" indent="-228600" algn="l" defTabSz="914400" rtl="0" eaLnBrk="1" latinLnBrk="0" hangingPunct="1">
-              <a:lnSpc>
-                <a:spcPct val="90000"/>
-              </a:lnSpc>
-              <a:spcBef>
-                <a:spcPts val="1000"/>
-              </a:spcBef>
-              <a:buFont typeface="Arial" panose="020B0604020202020204" pitchFamily="34" charset="0"/>
-              <a:buChar char="•"/>
-              <a:defRPr sz="2800" kern="1200">
-                <a:solidFill>
-                  <a:schemeClr val="tx1"/>
-                </a:solidFill>
-                <a:latin typeface="+mn-lt"/>
-                <a:ea typeface="+mn-ea"/>
-                <a:cs typeface="+mn-cs"/>
-              </a:defRPr>
-            </a:lvl1pPr>
-            <a:lvl2pPr marL="685800" indent="-228600" algn="l" defTabSz="914400" rtl="0" eaLnBrk="1" latinLnBrk="0" hangingPunct="1">
-              <a:lnSpc>
-                <a:spcPct val="90000"/>
-              </a:lnSpc>
-              <a:spcBef>
-                <a:spcPts val="500"/>
-              </a:spcBef>
-              <a:buFont typeface="Arial" panose="020B0604020202020204" pitchFamily="34" charset="0"/>
-              <a:buChar char="•"/>
-              <a:defRPr sz="2400" kern="1200">
-                <a:solidFill>
-                  <a:schemeClr val="tx1"/>
-                </a:solidFill>
-                <a:latin typeface="+mn-lt"/>
-                <a:ea typeface="+mn-ea"/>
-                <a:cs typeface="+mn-cs"/>
-              </a:defRPr>
-            </a:lvl2pPr>
-            <a:lvl3pPr marL="1143000" indent="-228600" algn="l" defTabSz="914400" rtl="0" eaLnBrk="1" latinLnBrk="0" hangingPunct="1">
-              <a:lnSpc>
-                <a:spcPct val="90000"/>
-              </a:lnSpc>
-              <a:spcBef>
-                <a:spcPts val="500"/>
-              </a:spcBef>
-              <a:buFont typeface="Arial" panose="020B0604020202020204" pitchFamily="34" charset="0"/>
-              <a:buChar char="•"/>
-              <a:defRPr sz="2000" kern="1200">
-                <a:solidFill>
-                  <a:schemeClr val="tx1"/>
-                </a:solidFill>
-                <a:latin typeface="+mn-lt"/>
-                <a:ea typeface="+mn-ea"/>
-                <a:cs typeface="+mn-cs"/>
-              </a:defRPr>
-            </a:lvl3pPr>
-            <a:lvl4pPr marL="1600200" indent="-228600" algn="l" defTabSz="914400" rtl="0" eaLnBrk="1" latinLnBrk="0" hangingPunct="1">
-              <a:lnSpc>
-                <a:spcPct val="90000"/>
-              </a:lnSpc>
-              <a:spcBef>
-                <a:spcPts val="500"/>
-              </a:spcBef>
-              <a:buFont typeface="Arial" panose="020B0604020202020204" pitchFamily="34" charset="0"/>
-              <a:buChar char="•"/>
-              <a:defRPr sz="1800" kern="1200">
-                <a:solidFill>
-                  <a:schemeClr val="tx1"/>
-                </a:solidFill>
-                <a:latin typeface="+mn-lt"/>
-                <a:ea typeface="+mn-ea"/>
-                <a:cs typeface="+mn-cs"/>
-              </a:defRPr>
-            </a:lvl4pPr>
-            <a:lvl5pPr marL="2057400" indent="-228600" algn="l" defTabSz="914400" rtl="0" eaLnBrk="1" latinLnBrk="0" hangingPunct="1">
-              <a:lnSpc>
-                <a:spcPct val="90000"/>
-              </a:lnSpc>
-              <a:spcBef>
-                <a:spcPts val="500"/>
-              </a:spcBef>
-              <a:buFont typeface="Arial" panose="020B0604020202020204" pitchFamily="34" charset="0"/>
-              <a:buChar char="•"/>
-              <a:defRPr sz="1800" kern="1200">
-                <a:solidFill>
-                  <a:schemeClr val="tx1"/>
-                </a:solidFill>
-                <a:latin typeface="+mn-lt"/>
-                <a:ea typeface="+mn-ea"/>
-                <a:cs typeface="+mn-cs"/>
-              </a:defRPr>
-            </a:lvl5pPr>
-            <a:lvl6pPr marL="2514600" indent="-228600" algn="l" defTabSz="914400" rtl="0" eaLnBrk="1" latinLnBrk="0" hangingPunct="1">
-              <a:lnSpc>
-                <a:spcPct val="90000"/>
-              </a:lnSpc>
-              <a:spcBef>
-                <a:spcPts val="500"/>
-              </a:spcBef>
-              <a:buFont typeface="Arial" panose="020B0604020202020204" pitchFamily="34" charset="0"/>
-              <a:buChar char="•"/>
-              <a:defRPr sz="1800" kern="1200">
-                <a:solidFill>
-                  <a:schemeClr val="tx1"/>
-                </a:solidFill>
-                <a:latin typeface="+mn-lt"/>
-                <a:ea typeface="+mn-ea"/>
-                <a:cs typeface="+mn-cs"/>
-              </a:defRPr>
-            </a:lvl6pPr>
-            <a:lvl7pPr marL="2971800" indent="-228600" algn="l" defTabSz="914400" rtl="0" eaLnBrk="1" latinLnBrk="0" hangingPunct="1">
-              <a:lnSpc>
-                <a:spcPct val="90000"/>
-              </a:lnSpc>
-              <a:spcBef>
-                <a:spcPts val="500"/>
-              </a:spcBef>
-              <a:buFont typeface="Arial" panose="020B0604020202020204" pitchFamily="34" charset="0"/>
-              <a:buChar char="•"/>
-              <a:defRPr sz="1800" kern="1200">
-                <a:solidFill>
-                  <a:schemeClr val="tx1"/>
-                </a:solidFill>
-                <a:latin typeface="+mn-lt"/>
-                <a:ea typeface="+mn-ea"/>
-                <a:cs typeface="+mn-cs"/>
-              </a:defRPr>
-            </a:lvl7pPr>
-            <a:lvl8pPr marL="3429000" indent="-228600" algn="l" defTabSz="914400" rtl="0" eaLnBrk="1" latinLnBrk="0" hangingPunct="1">
-              <a:lnSpc>
-                <a:spcPct val="90000"/>
-              </a:lnSpc>
-              <a:spcBef>
-                <a:spcPts val="500"/>
-              </a:spcBef>
-              <a:buFont typeface="Arial" panose="020B0604020202020204" pitchFamily="34" charset="0"/>
-              <a:buChar char="•"/>
-              <a:defRPr sz="1800" kern="1200">
-                <a:solidFill>
-                  <a:schemeClr val="tx1"/>
-                </a:solidFill>
-                <a:latin typeface="+mn-lt"/>
-                <a:ea typeface="+mn-ea"/>
-                <a:cs typeface="+mn-cs"/>
-              </a:defRPr>
-            </a:lvl8pPr>
-            <a:lvl9pPr marL="3886200" indent="-228600" algn="l" defTabSz="914400" rtl="0" eaLnBrk="1" latinLnBrk="0" hangingPunct="1">
-              <a:lnSpc>
-                <a:spcPct val="90000"/>
-              </a:lnSpc>
-              <a:spcBef>
-                <a:spcPts val="500"/>
-              </a:spcBef>
-              <a:buFont typeface="Arial" panose="020B0604020202020204" pitchFamily="34" charset="0"/>
-              <a:buChar char="•"/>
-              <a:defRPr sz="1800" kern="1200">
-                <a:solidFill>
-                  <a:schemeClr val="tx1"/>
-                </a:solidFill>
-                <a:latin typeface="+mn-lt"/>
-                <a:ea typeface="+mn-ea"/>
-                <a:cs typeface="+mn-cs"/>
-              </a:defRPr>
-            </a:lvl9pPr>
-          </a:lstStyle>
-          <a:p>
-            <a:pPr marL="0" indent="0" algn="just">
-              <a:buNone/>
-            </a:pPr>
-            <a:r>
-              <a:rPr lang="es-MX" dirty="0"/>
-              <a:t>“(…) Derecho de gentes. Se trata aquí de una nación considerada como una persona moral respecto de otra nación en el estado de libertad natural, por consiguiente, también en el estado de guerra continuo; y entonces el problema por resolver se refiere: 1º al derecho antes de la guerra; 2º al derecho durante la guerra; 3º al derecho de obligarse mutuamente a salir de este estado de guerra, y por consiguiente a establecer una constitución que funde una paz perpetua, es decir, el derecho después de la guerra. (2008; p. 214) </a:t>
-            </a:r>
-            <a:endParaRPr lang="de-DE" dirty="0"/>
-          </a:p>
-        </p:txBody>
-      </p:sp>
-    </p:spTree>
-    <p:extLst>
-      <p:ext uri="{BB962C8B-B14F-4D97-AF65-F5344CB8AC3E}">
-        <p14:creationId xmlns:p14="http://schemas.microsoft.com/office/powerpoint/2010/main" val="3842937137"/>
       </p:ext>
     </p:extLst>
   </p:cSld>
@@ -29322,6 +29373,333 @@
         <p:cNvPr id="1" name="">
           <a:extLst>
             <a:ext uri="{FF2B5EF4-FFF2-40B4-BE49-F238E27FC236}">
+              <a16:creationId xmlns:a16="http://schemas.microsoft.com/office/drawing/2014/main" id="{5E51E5CD-0CE0-C710-2C70-7BFD766C4F8A}"/>
+            </a:ext>
+          </a:extLst>
+        </p:cNvPr>
+        <p:cNvGrpSpPr/>
+        <p:nvPr/>
+      </p:nvGrpSpPr>
+      <p:grpSpPr>
+        <a:xfrm>
+          <a:off x="0" y="0"/>
+          <a:ext cx="0" cy="0"/>
+          <a:chOff x="0" y="0"/>
+          <a:chExt cx="0" cy="0"/>
+        </a:xfrm>
+      </p:grpSpPr>
+      <p:sp>
+        <p:nvSpPr>
+          <p:cNvPr id="3" name="Content Placeholder 2">
+            <a:extLst>
+              <a:ext uri="{FF2B5EF4-FFF2-40B4-BE49-F238E27FC236}">
+                <a16:creationId xmlns:a16="http://schemas.microsoft.com/office/drawing/2014/main" id="{EBA6AB39-B205-4BF7-858C-3EC1EF5B141D}"/>
+              </a:ext>
+            </a:extLst>
+          </p:cNvPr>
+          <p:cNvSpPr>
+            <a:spLocks noGrp="1"/>
+          </p:cNvSpPr>
+          <p:nvPr>
+            <p:ph idx="1"/>
+          </p:nvPr>
+        </p:nvSpPr>
+        <p:spPr>
+          <a:xfrm>
+            <a:off x="838200" y="1"/>
+            <a:ext cx="10515600" cy="1104899"/>
+          </a:xfrm>
+        </p:spPr>
+        <p:txBody>
+          <a:bodyPr>
+            <a:normAutofit fontScale="92500" lnSpcReduction="10000"/>
+          </a:bodyPr>
+          <a:lstStyle/>
+          <a:p>
+            <a:pPr algn="just"/>
+            <a:r>
+              <a:rPr lang="en-US" dirty="0"/>
+              <a:t>1797: </a:t>
+            </a:r>
+            <a:r>
+              <a:rPr lang="en-US" i="1" dirty="0">
+                <a:solidFill>
+                  <a:srgbClr val="FF0000"/>
+                </a:solidFill>
+              </a:rPr>
+              <a:t>Metaphysics of Morals</a:t>
+            </a:r>
+            <a:r>
+              <a:rPr lang="en-US" dirty="0">
+                <a:solidFill>
+                  <a:srgbClr val="FF0000"/>
+                </a:solidFill>
+              </a:rPr>
+              <a:t> </a:t>
+            </a:r>
+            <a:r>
+              <a:rPr lang="en-US" dirty="0"/>
+              <a:t>[</a:t>
+            </a:r>
+            <a:r>
+              <a:rPr lang="en-US" b="1" dirty="0"/>
+              <a:t>MM</a:t>
+            </a:r>
+            <a:r>
+              <a:rPr lang="en-US" dirty="0"/>
+              <a:t>] (</a:t>
+            </a:r>
+            <a:r>
+              <a:rPr lang="en-US" i="1" dirty="0" err="1"/>
+              <a:t>Metaphysik</a:t>
+            </a:r>
+            <a:r>
+              <a:rPr lang="en-US" i="1" dirty="0"/>
+              <a:t> der </a:t>
+            </a:r>
+            <a:r>
+              <a:rPr lang="en-US" i="1" dirty="0" err="1"/>
+              <a:t>Sitten</a:t>
+            </a:r>
+            <a:r>
+              <a:rPr lang="en-US" dirty="0"/>
+              <a:t>). First part is The Doctrine of Right, which has often been published separately as The Science of Right.</a:t>
+            </a:r>
+          </a:p>
+          <a:p>
+            <a:pPr algn="just"/>
+            <a:endParaRPr lang="de-DE" dirty="0"/>
+          </a:p>
+          <a:p>
+            <a:pPr algn="just"/>
+            <a:endParaRPr lang="de-DE" dirty="0"/>
+          </a:p>
+        </p:txBody>
+      </p:sp>
+      <p:sp>
+        <p:nvSpPr>
+          <p:cNvPr id="2" name="Content Placeholder 2">
+            <a:extLst>
+              <a:ext uri="{FF2B5EF4-FFF2-40B4-BE49-F238E27FC236}">
+                <a16:creationId xmlns:a16="http://schemas.microsoft.com/office/drawing/2014/main" id="{B3BD1A68-14E7-EF8B-D015-B18861402798}"/>
+              </a:ext>
+            </a:extLst>
+          </p:cNvPr>
+          <p:cNvSpPr txBox="1">
+            <a:spLocks/>
+          </p:cNvSpPr>
+          <p:nvPr/>
+        </p:nvSpPr>
+        <p:spPr>
+          <a:xfrm>
+            <a:off x="365759" y="1246909"/>
+            <a:ext cx="11621193" cy="5453149"/>
+          </a:xfrm>
+          <a:prstGeom prst="rect">
+            <a:avLst/>
+          </a:prstGeom>
+        </p:spPr>
+        <p:txBody>
+          <a:bodyPr vert="horz" lIns="91440" tIns="45720" rIns="91440" bIns="45720" rtlCol="0">
+            <a:normAutofit/>
+          </a:bodyPr>
+          <a:lstStyle>
+            <a:lvl1pPr marL="228600" indent="-228600" algn="l" defTabSz="914400" rtl="0" eaLnBrk="1" latinLnBrk="0" hangingPunct="1">
+              <a:lnSpc>
+                <a:spcPct val="90000"/>
+              </a:lnSpc>
+              <a:spcBef>
+                <a:spcPts val="1000"/>
+              </a:spcBef>
+              <a:buFont typeface="Arial" panose="020B0604020202020204" pitchFamily="34" charset="0"/>
+              <a:buChar char="•"/>
+              <a:defRPr sz="2800" kern="1200">
+                <a:solidFill>
+                  <a:schemeClr val="tx1"/>
+                </a:solidFill>
+                <a:latin typeface="+mn-lt"/>
+                <a:ea typeface="+mn-ea"/>
+                <a:cs typeface="+mn-cs"/>
+              </a:defRPr>
+            </a:lvl1pPr>
+            <a:lvl2pPr marL="685800" indent="-228600" algn="l" defTabSz="914400" rtl="0" eaLnBrk="1" latinLnBrk="0" hangingPunct="1">
+              <a:lnSpc>
+                <a:spcPct val="90000"/>
+              </a:lnSpc>
+              <a:spcBef>
+                <a:spcPts val="500"/>
+              </a:spcBef>
+              <a:buFont typeface="Arial" panose="020B0604020202020204" pitchFamily="34" charset="0"/>
+              <a:buChar char="•"/>
+              <a:defRPr sz="2400" kern="1200">
+                <a:solidFill>
+                  <a:schemeClr val="tx1"/>
+                </a:solidFill>
+                <a:latin typeface="+mn-lt"/>
+                <a:ea typeface="+mn-ea"/>
+                <a:cs typeface="+mn-cs"/>
+              </a:defRPr>
+            </a:lvl2pPr>
+            <a:lvl3pPr marL="1143000" indent="-228600" algn="l" defTabSz="914400" rtl="0" eaLnBrk="1" latinLnBrk="0" hangingPunct="1">
+              <a:lnSpc>
+                <a:spcPct val="90000"/>
+              </a:lnSpc>
+              <a:spcBef>
+                <a:spcPts val="500"/>
+              </a:spcBef>
+              <a:buFont typeface="Arial" panose="020B0604020202020204" pitchFamily="34" charset="0"/>
+              <a:buChar char="•"/>
+              <a:defRPr sz="2000" kern="1200">
+                <a:solidFill>
+                  <a:schemeClr val="tx1"/>
+                </a:solidFill>
+                <a:latin typeface="+mn-lt"/>
+                <a:ea typeface="+mn-ea"/>
+                <a:cs typeface="+mn-cs"/>
+              </a:defRPr>
+            </a:lvl3pPr>
+            <a:lvl4pPr marL="1600200" indent="-228600" algn="l" defTabSz="914400" rtl="0" eaLnBrk="1" latinLnBrk="0" hangingPunct="1">
+              <a:lnSpc>
+                <a:spcPct val="90000"/>
+              </a:lnSpc>
+              <a:spcBef>
+                <a:spcPts val="500"/>
+              </a:spcBef>
+              <a:buFont typeface="Arial" panose="020B0604020202020204" pitchFamily="34" charset="0"/>
+              <a:buChar char="•"/>
+              <a:defRPr sz="1800" kern="1200">
+                <a:solidFill>
+                  <a:schemeClr val="tx1"/>
+                </a:solidFill>
+                <a:latin typeface="+mn-lt"/>
+                <a:ea typeface="+mn-ea"/>
+                <a:cs typeface="+mn-cs"/>
+              </a:defRPr>
+            </a:lvl4pPr>
+            <a:lvl5pPr marL="2057400" indent="-228600" algn="l" defTabSz="914400" rtl="0" eaLnBrk="1" latinLnBrk="0" hangingPunct="1">
+              <a:lnSpc>
+                <a:spcPct val="90000"/>
+              </a:lnSpc>
+              <a:spcBef>
+                <a:spcPts val="500"/>
+              </a:spcBef>
+              <a:buFont typeface="Arial" panose="020B0604020202020204" pitchFamily="34" charset="0"/>
+              <a:buChar char="•"/>
+              <a:defRPr sz="1800" kern="1200">
+                <a:solidFill>
+                  <a:schemeClr val="tx1"/>
+                </a:solidFill>
+                <a:latin typeface="+mn-lt"/>
+                <a:ea typeface="+mn-ea"/>
+                <a:cs typeface="+mn-cs"/>
+              </a:defRPr>
+            </a:lvl5pPr>
+            <a:lvl6pPr marL="2514600" indent="-228600" algn="l" defTabSz="914400" rtl="0" eaLnBrk="1" latinLnBrk="0" hangingPunct="1">
+              <a:lnSpc>
+                <a:spcPct val="90000"/>
+              </a:lnSpc>
+              <a:spcBef>
+                <a:spcPts val="500"/>
+              </a:spcBef>
+              <a:buFont typeface="Arial" panose="020B0604020202020204" pitchFamily="34" charset="0"/>
+              <a:buChar char="•"/>
+              <a:defRPr sz="1800" kern="1200">
+                <a:solidFill>
+                  <a:schemeClr val="tx1"/>
+                </a:solidFill>
+                <a:latin typeface="+mn-lt"/>
+                <a:ea typeface="+mn-ea"/>
+                <a:cs typeface="+mn-cs"/>
+              </a:defRPr>
+            </a:lvl6pPr>
+            <a:lvl7pPr marL="2971800" indent="-228600" algn="l" defTabSz="914400" rtl="0" eaLnBrk="1" latinLnBrk="0" hangingPunct="1">
+              <a:lnSpc>
+                <a:spcPct val="90000"/>
+              </a:lnSpc>
+              <a:spcBef>
+                <a:spcPts val="500"/>
+              </a:spcBef>
+              <a:buFont typeface="Arial" panose="020B0604020202020204" pitchFamily="34" charset="0"/>
+              <a:buChar char="•"/>
+              <a:defRPr sz="1800" kern="1200">
+                <a:solidFill>
+                  <a:schemeClr val="tx1"/>
+                </a:solidFill>
+                <a:latin typeface="+mn-lt"/>
+                <a:ea typeface="+mn-ea"/>
+                <a:cs typeface="+mn-cs"/>
+              </a:defRPr>
+            </a:lvl7pPr>
+            <a:lvl8pPr marL="3429000" indent="-228600" algn="l" defTabSz="914400" rtl="0" eaLnBrk="1" latinLnBrk="0" hangingPunct="1">
+              <a:lnSpc>
+                <a:spcPct val="90000"/>
+              </a:lnSpc>
+              <a:spcBef>
+                <a:spcPts val="500"/>
+              </a:spcBef>
+              <a:buFont typeface="Arial" panose="020B0604020202020204" pitchFamily="34" charset="0"/>
+              <a:buChar char="•"/>
+              <a:defRPr sz="1800" kern="1200">
+                <a:solidFill>
+                  <a:schemeClr val="tx1"/>
+                </a:solidFill>
+                <a:latin typeface="+mn-lt"/>
+                <a:ea typeface="+mn-ea"/>
+                <a:cs typeface="+mn-cs"/>
+              </a:defRPr>
+            </a:lvl8pPr>
+            <a:lvl9pPr marL="3886200" indent="-228600" algn="l" defTabSz="914400" rtl="0" eaLnBrk="1" latinLnBrk="0" hangingPunct="1">
+              <a:lnSpc>
+                <a:spcPct val="90000"/>
+              </a:lnSpc>
+              <a:spcBef>
+                <a:spcPts val="500"/>
+              </a:spcBef>
+              <a:buFont typeface="Arial" panose="020B0604020202020204" pitchFamily="34" charset="0"/>
+              <a:buChar char="•"/>
+              <a:defRPr sz="1800" kern="1200">
+                <a:solidFill>
+                  <a:schemeClr val="tx1"/>
+                </a:solidFill>
+                <a:latin typeface="+mn-lt"/>
+                <a:ea typeface="+mn-ea"/>
+                <a:cs typeface="+mn-cs"/>
+              </a:defRPr>
+            </a:lvl9pPr>
+          </a:lstStyle>
+          <a:p>
+            <a:pPr marL="0" indent="0" algn="just">
+              <a:buNone/>
+            </a:pPr>
+            <a:r>
+              <a:rPr lang="es-MX" dirty="0"/>
+              <a:t>“(…) Derecho de gentes. Se trata aquí de una nación considerada como una persona moral respecto de otra nación en el estado de libertad natural, por consiguiente, también en el estado de guerra continuo; y entonces el problema por resolver se refiere: 1º al derecho antes de la guerra; 2º al derecho durante la guerra; 3º al derecho de obligarse mutuamente a salir de este estado de guerra, y por consiguiente a establecer una constitución que funde una paz perpetua, es decir, el derecho después de la guerra. (2008; p. 214) </a:t>
+            </a:r>
+            <a:endParaRPr lang="de-DE" dirty="0"/>
+          </a:p>
+        </p:txBody>
+      </p:sp>
+    </p:spTree>
+    <p:extLst>
+      <p:ext uri="{BB962C8B-B14F-4D97-AF65-F5344CB8AC3E}">
+        <p14:creationId xmlns:p14="http://schemas.microsoft.com/office/powerpoint/2010/main" val="3842937137"/>
+      </p:ext>
+    </p:extLst>
+  </p:cSld>
+  <p:clrMapOvr>
+    <a:masterClrMapping/>
+  </p:clrMapOvr>
+</p:sld>
+</file>
+
+<file path=ppt/slides/slide61.xml><?xml version="1.0" encoding="utf-8"?>
+<p:sld xmlns:a="http://schemas.openxmlformats.org/drawingml/2006/main" xmlns:r="http://schemas.openxmlformats.org/officeDocument/2006/relationships" xmlns:p="http://schemas.openxmlformats.org/presentationml/2006/main">
+  <p:cSld>
+    <p:spTree>
+      <p:nvGrpSpPr>
+        <p:cNvPr id="1" name="">
+          <a:extLst>
+            <a:ext uri="{FF2B5EF4-FFF2-40B4-BE49-F238E27FC236}">
               <a16:creationId xmlns:a16="http://schemas.microsoft.com/office/drawing/2014/main" id="{F0C98912-73D5-037E-1E9C-99FEB4A5ECC6}"/>
             </a:ext>
           </a:extLst>
@@ -29649,7 +30027,7 @@
 </p:sld>
 </file>
 
-<file path=ppt/slides/slide61.xml><?xml version="1.0" encoding="utf-8"?>
+<file path=ppt/slides/slide62.xml><?xml version="1.0" encoding="utf-8"?>
 <p:sld xmlns:a="http://schemas.openxmlformats.org/drawingml/2006/main" xmlns:r="http://schemas.openxmlformats.org/officeDocument/2006/relationships" xmlns:p="http://schemas.openxmlformats.org/presentationml/2006/main">
   <p:cSld>
     <p:spTree>
@@ -30006,7 +30384,7 @@
 </p:sld>
 </file>
 
-<file path=ppt/slides/slide62.xml><?xml version="1.0" encoding="utf-8"?>
+<file path=ppt/slides/slide63.xml><?xml version="1.0" encoding="utf-8"?>
 <p:sld xmlns:a="http://schemas.openxmlformats.org/drawingml/2006/main" xmlns:r="http://schemas.openxmlformats.org/officeDocument/2006/relationships" xmlns:p="http://schemas.openxmlformats.org/presentationml/2006/main">
   <p:cSld>
     <p:spTree>

</xml_diff>